<commit_message>
216 lec 11 fixed
</commit_message>
<xml_diff>
--- a/16216/f15/lectures/16.216f15_lec11_exam1preview.pptx
+++ b/16216/f15/lectures/16.216f15_lec11_exam1preview.pptx
@@ -5,10 +5,10 @@
     <p:sldMasterId id="2147483792" r:id="rId1"/>
   </p:sldMasterIdLst>
   <p:notesMasterIdLst>
-    <p:notesMasterId r:id="rId15"/>
+    <p:notesMasterId r:id="rId16"/>
   </p:notesMasterIdLst>
   <p:handoutMasterIdLst>
-    <p:handoutMasterId r:id="rId16"/>
+    <p:handoutMasterId r:id="rId17"/>
   </p:handoutMasterIdLst>
   <p:sldIdLst>
     <p:sldId id="256" r:id="rId2"/>
@@ -23,7 +23,8 @@
     <p:sldId id="572" r:id="rId11"/>
     <p:sldId id="573" r:id="rId12"/>
     <p:sldId id="574" r:id="rId13"/>
-    <p:sldId id="447" r:id="rId14"/>
+    <p:sldId id="578" r:id="rId14"/>
+    <p:sldId id="447" r:id="rId15"/>
   </p:sldIdLst>
   <p:sldSz cx="9144000" cy="6858000" type="screen4x3"/>
   <p:notesSz cx="9144000" cy="6858000"/>
@@ -518,7 +519,7 @@
         <p:nvSpPr>
           <p:cNvPr id="20484" name="Rectangle 4"/>
           <p:cNvSpPr>
-            <a:spLocks noRot="1" noChangeArrowheads="1" noTextEdit="1"/>
+            <a:spLocks noGrp="1" noRot="1" noChangeAspect="1" noChangeArrowheads="1" noTextEdit="1"/>
           </p:cNvSpPr>
           <p:nvPr>
             <p:ph type="sldImg" idx="2"/>
@@ -1040,7 +1041,7 @@
         <p:nvSpPr>
           <p:cNvPr id="21507" name="Rectangle 2"/>
           <p:cNvSpPr>
-            <a:spLocks noRot="1" noChangeArrowheads="1" noTextEdit="1"/>
+            <a:spLocks noGrp="1" noRot="1" noChangeAspect="1" noChangeArrowheads="1" noTextEdit="1"/>
           </p:cNvSpPr>
           <p:nvPr>
             <p:ph type="sldImg"/>
@@ -1286,7 +1287,7 @@
         <p:nvSpPr>
           <p:cNvPr id="22531" name="Rectangle 2"/>
           <p:cNvSpPr>
-            <a:spLocks noRot="1" noChangeArrowheads="1" noTextEdit="1"/>
+            <a:spLocks noGrp="1" noRot="1" noChangeAspect="1" noChangeArrowheads="1" noTextEdit="1"/>
           </p:cNvSpPr>
           <p:nvPr>
             <p:ph type="sldImg"/>
@@ -1532,7 +1533,7 @@
         <p:nvSpPr>
           <p:cNvPr id="23555" name="Rectangle 2"/>
           <p:cNvSpPr>
-            <a:spLocks noRot="1" noChangeArrowheads="1" noTextEdit="1"/>
+            <a:spLocks noGrp="1" noRot="1" noChangeAspect="1" noChangeArrowheads="1" noTextEdit="1"/>
           </p:cNvSpPr>
           <p:nvPr>
             <p:ph type="sldImg"/>
@@ -1820,7 +1821,7 @@
             <a:fld id="{685BC99B-EEFE-334F-813B-AEC7A16AE45D}" type="datetime1">
               <a:rPr lang="en-US"/>
               <a:pPr/>
-              <a:t>9/26/15</a:t>
+              <a:t>9/28/15</a:t>
             </a:fld>
             <a:endParaRPr lang="en-US"/>
           </a:p>
@@ -2017,7 +2018,7 @@
             <a:fld id="{4D6D903D-1954-B947-8DBC-CD8C200EC178}" type="datetime1">
               <a:rPr lang="en-US"/>
               <a:pPr/>
-              <a:t>9/26/15</a:t>
+              <a:t>9/28/15</a:t>
             </a:fld>
             <a:endParaRPr lang="en-US"/>
           </a:p>
@@ -2223,7 +2224,7 @@
             <a:fld id="{E3DE650F-ED7D-E549-8D88-5445EB72B94E}" type="datetime1">
               <a:rPr lang="en-US"/>
               <a:pPr/>
-              <a:t>9/26/15</a:t>
+              <a:t>9/28/15</a:t>
             </a:fld>
             <a:endParaRPr lang="en-US"/>
           </a:p>
@@ -2486,7 +2487,7 @@
             <a:fld id="{81D4C80D-2DBA-EC49-A1C4-420A520E9E53}" type="datetime1">
               <a:rPr lang="en-US"/>
               <a:pPr/>
-              <a:t>9/26/15</a:t>
+              <a:t>9/28/15</a:t>
             </a:fld>
             <a:endParaRPr lang="en-US"/>
           </a:p>
@@ -2749,7 +2750,7 @@
             <a:fld id="{EDAC6660-0E21-6E4A-BDC4-3E548606975B}" type="datetime1">
               <a:rPr lang="en-US"/>
               <a:pPr/>
-              <a:t>9/26/15</a:t>
+              <a:t>9/28/15</a:t>
             </a:fld>
             <a:endParaRPr lang="en-US"/>
           </a:p>
@@ -2926,7 +2927,7 @@
             <a:fld id="{B14ABDA3-29F8-F34B-9DF8-AA736D72FF97}" type="datetime1">
               <a:rPr lang="en-US"/>
               <a:pPr/>
-              <a:t>9/26/15</a:t>
+              <a:t>9/28/15</a:t>
             </a:fld>
             <a:endParaRPr lang="en-US"/>
           </a:p>
@@ -3123,7 +3124,7 @@
             <a:fld id="{86E5A339-8781-EF46-98EF-6E77AB1DB61E}" type="datetime1">
               <a:rPr lang="en-US"/>
               <a:pPr/>
-              <a:t>9/26/15</a:t>
+              <a:t>9/28/15</a:t>
             </a:fld>
             <a:endParaRPr lang="en-US"/>
           </a:p>
@@ -3341,7 +3342,7 @@
             <a:fld id="{A7DD67F6-9AB2-AD40-887D-2FB8350896AD}" type="datetime1">
               <a:rPr lang="en-US"/>
               <a:pPr/>
-              <a:t>9/26/15</a:t>
+              <a:t>9/28/15</a:t>
             </a:fld>
             <a:endParaRPr lang="en-US"/>
           </a:p>
@@ -3655,7 +3656,7 @@
             <a:fld id="{46BEA0C4-2D3C-A74E-8A86-D05344921191}" type="datetime1">
               <a:rPr lang="en-US"/>
               <a:pPr/>
-              <a:t>9/26/15</a:t>
+              <a:t>9/28/15</a:t>
             </a:fld>
             <a:endParaRPr lang="en-US"/>
           </a:p>
@@ -4108,7 +4109,7 @@
             <a:fld id="{634113EE-B592-8749-88C2-27D9DFE10CC0}" type="datetime1">
               <a:rPr lang="en-US"/>
               <a:pPr/>
-              <a:t>9/26/15</a:t>
+              <a:t>9/28/15</a:t>
             </a:fld>
             <a:endParaRPr lang="en-US"/>
           </a:p>
@@ -4252,7 +4253,7 @@
             <a:fld id="{1ED7F4E6-34A1-8C42-B249-662C228BDFB2}" type="datetime1">
               <a:rPr lang="en-US"/>
               <a:pPr/>
-              <a:t>9/26/15</a:t>
+              <a:t>9/28/15</a:t>
             </a:fld>
             <a:endParaRPr lang="en-US"/>
           </a:p>
@@ -4373,7 +4374,7 @@
             <a:fld id="{CB25DF7E-F48B-E34A-A60B-B4FB44518CA0}" type="datetime1">
               <a:rPr lang="en-US"/>
               <a:pPr/>
-              <a:t>9/26/15</a:t>
+              <a:t>9/28/15</a:t>
             </a:fld>
             <a:endParaRPr lang="en-US"/>
           </a:p>
@@ -4676,7 +4677,7 @@
             <a:fld id="{7C86247B-8113-6B46-814E-982D8B7A7284}" type="datetime1">
               <a:rPr lang="en-US"/>
               <a:pPr/>
-              <a:t>9/26/15</a:t>
+              <a:t>9/28/15</a:t>
             </a:fld>
             <a:endParaRPr lang="en-US"/>
           </a:p>
@@ -4956,7 +4957,7 @@
             <a:fld id="{12EF2F87-FB2C-8644-A0A8-4ACADEC109B6}" type="datetime1">
               <a:rPr lang="en-US"/>
               <a:pPr/>
-              <a:t>9/26/15</a:t>
+              <a:t>9/28/15</a:t>
             </a:fld>
             <a:endParaRPr lang="en-US"/>
           </a:p>
@@ -5255,7 +5256,7 @@
             <a:fld id="{7209C2CC-DB20-1744-A860-C162776A4B9A}" type="datetime1">
               <a:rPr lang="en-US"/>
               <a:pPr/>
-              <a:t>9/26/15</a:t>
+              <a:t>9/28/15</a:t>
             </a:fld>
             <a:endParaRPr lang="en-US"/>
           </a:p>
@@ -6688,7 +6689,7 @@
                 <a:latin typeface="Garamond" charset="0"/>
               </a:rPr>
               <a:pPr eaLnBrk="1" hangingPunct="1"/>
-              <a:t>9/26/15</a:t>
+              <a:t>9/28/15</a:t>
             </a:fld>
             <a:endParaRPr lang="en-US">
               <a:latin typeface="Garamond" charset="0"/>
@@ -7330,7 +7331,7 @@
                 <a:latin typeface="Garamond" charset="0"/>
               </a:rPr>
               <a:pPr eaLnBrk="1" hangingPunct="1"/>
-              <a:t>9/26/15</a:t>
+              <a:t>9/28/15</a:t>
             </a:fld>
             <a:endParaRPr lang="en-US">
               <a:latin typeface="Garamond" charset="0"/>
@@ -7817,7 +7818,7 @@
                 <a:latin typeface="Garamond" charset="0"/>
               </a:rPr>
               <a:pPr eaLnBrk="1" hangingPunct="1"/>
-              <a:t>9/26/15</a:t>
+              <a:t>9/28/15</a:t>
             </a:fld>
             <a:endParaRPr lang="en-US">
               <a:latin typeface="Garamond" charset="0"/>
@@ -8028,6 +8029,687 @@
       </p:grpSpPr>
       <p:sp>
         <p:nvSpPr>
+          <p:cNvPr id="20481" name="Title 1"/>
+          <p:cNvSpPr>
+            <a:spLocks noGrp="1"/>
+          </p:cNvSpPr>
+          <p:nvPr>
+            <p:ph type="title"/>
+          </p:nvPr>
+        </p:nvSpPr>
+        <p:spPr/>
+        <p:txBody>
+          <a:bodyPr/>
+          <a:lstStyle/>
+          <a:p>
+            <a:r>
+              <a:rPr lang="en-US" dirty="0">
+                <a:latin typeface="Garamond" charset="0"/>
+              </a:rPr>
+              <a:t>Iterative </a:t>
+            </a:r>
+            <a:r>
+              <a:rPr lang="en-US" dirty="0" smtClean="0">
+                <a:latin typeface="Garamond" charset="0"/>
+              </a:rPr>
+              <a:t>methods </a:t>
+            </a:r>
+            <a:r>
+              <a:rPr lang="en-US" smtClean="0">
+                <a:latin typeface="Garamond" charset="0"/>
+              </a:rPr>
+              <a:t>(Program 4)</a:t>
+            </a:r>
+            <a:endParaRPr lang="en-US">
+              <a:latin typeface="Garamond" charset="0"/>
+            </a:endParaRPr>
+          </a:p>
+        </p:txBody>
+      </p:sp>
+      <p:sp>
+        <p:nvSpPr>
+          <p:cNvPr id="20482" name="Content Placeholder 2"/>
+          <p:cNvSpPr>
+            <a:spLocks noGrp="1"/>
+          </p:cNvSpPr>
+          <p:nvPr>
+            <p:ph idx="1"/>
+          </p:nvPr>
+        </p:nvSpPr>
+        <p:spPr/>
+        <p:txBody>
+          <a:bodyPr/>
+          <a:lstStyle/>
+          <a:p>
+            <a:pPr>
+              <a:lnSpc>
+                <a:spcPct val="80000"/>
+              </a:lnSpc>
+            </a:pPr>
+            <a:r>
+              <a:rPr lang="en-US" sz="2300">
+                <a:latin typeface="Arial" charset="0"/>
+              </a:rPr>
+              <a:t>Repeat calculation until correct value reached</a:t>
+            </a:r>
+          </a:p>
+          <a:p>
+            <a:pPr>
+              <a:lnSpc>
+                <a:spcPct val="80000"/>
+              </a:lnSpc>
+            </a:pPr>
+            <a:r>
+              <a:rPr lang="ja-JP" altLang="en-US" sz="2300">
+                <a:latin typeface="Arial" charset="0"/>
+              </a:rPr>
+              <a:t>“</a:t>
+            </a:r>
+            <a:r>
+              <a:rPr lang="en-US" altLang="ja-JP" sz="2300">
+                <a:latin typeface="Arial" charset="0"/>
+              </a:rPr>
+              <a:t>Correctness</a:t>
+            </a:r>
+            <a:r>
+              <a:rPr lang="ja-JP" altLang="en-US" sz="2300">
+                <a:latin typeface="Arial" charset="0"/>
+              </a:rPr>
+              <a:t>”</a:t>
+            </a:r>
+            <a:r>
+              <a:rPr lang="en-US" altLang="ja-JP" sz="2300">
+                <a:latin typeface="Arial" charset="0"/>
+              </a:rPr>
+              <a:t> defined as:</a:t>
+            </a:r>
+          </a:p>
+          <a:p>
+            <a:pPr lvl="1">
+              <a:lnSpc>
+                <a:spcPct val="80000"/>
+              </a:lnSpc>
+            </a:pPr>
+            <a:r>
+              <a:rPr lang="en-US" sz="2000">
+                <a:latin typeface="Arial" charset="0"/>
+              </a:rPr>
+              <a:t>Difference between old, new value &lt;= max error</a:t>
+            </a:r>
+          </a:p>
+          <a:p>
+            <a:pPr lvl="1">
+              <a:lnSpc>
+                <a:spcPct val="80000"/>
+              </a:lnSpc>
+            </a:pPr>
+            <a:r>
+              <a:rPr lang="en-US" sz="2000">
+                <a:latin typeface="Arial" charset="0"/>
+              </a:rPr>
+              <a:t>Max error == .000001 in Prog. 4</a:t>
+            </a:r>
+          </a:p>
+          <a:p>
+            <a:pPr>
+              <a:lnSpc>
+                <a:spcPct val="80000"/>
+              </a:lnSpc>
+            </a:pPr>
+            <a:r>
+              <a:rPr lang="en-US" sz="2300">
+                <a:latin typeface="Arial" charset="0"/>
+              </a:rPr>
+              <a:t>General process:</a:t>
+            </a:r>
+          </a:p>
+          <a:p>
+            <a:pPr>
+              <a:lnSpc>
+                <a:spcPct val="80000"/>
+              </a:lnSpc>
+              <a:buFont typeface="Wingdings" charset="0"/>
+              <a:buNone/>
+            </a:pPr>
+            <a:r>
+              <a:rPr lang="en-US" sz="2300">
+                <a:latin typeface="Courier New" charset="0"/>
+                <a:cs typeface="Courier New" charset="0"/>
+              </a:rPr>
+              <a:t>newVal = &lt;initial value&gt;;</a:t>
+            </a:r>
+          </a:p>
+          <a:p>
+            <a:pPr>
+              <a:lnSpc>
+                <a:spcPct val="80000"/>
+              </a:lnSpc>
+              <a:buFont typeface="Wingdings" charset="0"/>
+              <a:buNone/>
+            </a:pPr>
+            <a:r>
+              <a:rPr lang="en-US" sz="2300">
+                <a:latin typeface="Courier New" charset="0"/>
+                <a:cs typeface="Courier New" charset="0"/>
+              </a:rPr>
+              <a:t>do {</a:t>
+            </a:r>
+          </a:p>
+          <a:p>
+            <a:pPr>
+              <a:lnSpc>
+                <a:spcPct val="80000"/>
+              </a:lnSpc>
+              <a:buFont typeface="Wingdings" charset="0"/>
+              <a:buNone/>
+            </a:pPr>
+            <a:r>
+              <a:rPr lang="en-US" sz="2300">
+                <a:latin typeface="Courier New" charset="0"/>
+                <a:cs typeface="Courier New" charset="0"/>
+              </a:rPr>
+              <a:t>	oldVal = newVal;</a:t>
+            </a:r>
+          </a:p>
+          <a:p>
+            <a:pPr>
+              <a:lnSpc>
+                <a:spcPct val="80000"/>
+              </a:lnSpc>
+              <a:buFont typeface="Wingdings" charset="0"/>
+              <a:buNone/>
+            </a:pPr>
+            <a:r>
+              <a:rPr lang="en-US" sz="2300">
+                <a:latin typeface="Courier New" charset="0"/>
+                <a:cs typeface="Courier New" charset="0"/>
+              </a:rPr>
+              <a:t>	newVal = &lt;equation based on oldVal&gt;;</a:t>
+            </a:r>
+          </a:p>
+          <a:p>
+            <a:pPr>
+              <a:lnSpc>
+                <a:spcPct val="80000"/>
+              </a:lnSpc>
+              <a:buFont typeface="Wingdings" charset="0"/>
+              <a:buNone/>
+            </a:pPr>
+            <a:r>
+              <a:rPr lang="en-US" sz="2300">
+                <a:latin typeface="Courier New" charset="0"/>
+                <a:cs typeface="Courier New" charset="0"/>
+              </a:rPr>
+              <a:t>} while (fabs(newVal – oldVal) &gt; max_err);</a:t>
+            </a:r>
+          </a:p>
+          <a:p>
+            <a:pPr>
+              <a:lnSpc>
+                <a:spcPct val="80000"/>
+              </a:lnSpc>
+            </a:pPr>
+            <a:endParaRPr lang="en-US" sz="2300">
+              <a:latin typeface="Arial" charset="0"/>
+              <a:cs typeface="Courier New" charset="0"/>
+            </a:endParaRPr>
+          </a:p>
+          <a:p>
+            <a:pPr>
+              <a:lnSpc>
+                <a:spcPct val="80000"/>
+              </a:lnSpc>
+            </a:pPr>
+            <a:r>
+              <a:rPr lang="en-US" sz="2300">
+                <a:latin typeface="Arial" charset="0"/>
+                <a:cs typeface="Courier New" charset="0"/>
+              </a:rPr>
+              <a:t>Remember, you can</a:t>
+            </a:r>
+            <a:r>
+              <a:rPr lang="ja-JP" altLang="en-US" sz="2300">
+                <a:latin typeface="Arial" charset="0"/>
+                <a:cs typeface="Courier New" charset="0"/>
+              </a:rPr>
+              <a:t>’</a:t>
+            </a:r>
+            <a:r>
+              <a:rPr lang="en-US" altLang="ja-JP" sz="2300">
+                <a:latin typeface="Arial" charset="0"/>
+                <a:cs typeface="Courier New" charset="0"/>
+              </a:rPr>
+              <a:t>t use </a:t>
+            </a:r>
+            <a:r>
+              <a:rPr lang="en-US" altLang="ja-JP" sz="2300">
+                <a:latin typeface="Courier New" charset="0"/>
+                <a:cs typeface="Courier New" charset="0"/>
+              </a:rPr>
+              <a:t>&lt;math.h&gt;</a:t>
+            </a:r>
+            <a:r>
+              <a:rPr lang="en-US" altLang="ja-JP" sz="2300">
+                <a:latin typeface="Arial" charset="0"/>
+                <a:cs typeface="Courier New" charset="0"/>
+              </a:rPr>
+              <a:t>, so you</a:t>
+            </a:r>
+            <a:r>
+              <a:rPr lang="ja-JP" altLang="en-US" sz="2300">
+                <a:latin typeface="Arial" charset="0"/>
+                <a:cs typeface="Courier New" charset="0"/>
+              </a:rPr>
+              <a:t>’</a:t>
+            </a:r>
+            <a:r>
+              <a:rPr lang="en-US" altLang="ja-JP" sz="2300">
+                <a:latin typeface="Arial" charset="0"/>
+                <a:cs typeface="Courier New" charset="0"/>
+              </a:rPr>
+              <a:t>ll need your own way of computing absolute value (</a:t>
+            </a:r>
+            <a:r>
+              <a:rPr lang="en-US" altLang="ja-JP" sz="2300">
+                <a:latin typeface="Courier New" charset="0"/>
+                <a:cs typeface="Courier New" charset="0"/>
+              </a:rPr>
+              <a:t>fabs()</a:t>
+            </a:r>
+            <a:r>
+              <a:rPr lang="en-US" altLang="ja-JP" sz="2300">
+                <a:latin typeface="Arial" charset="0"/>
+                <a:cs typeface="Courier New" charset="0"/>
+              </a:rPr>
+              <a:t>)</a:t>
+            </a:r>
+            <a:endParaRPr lang="en-US" sz="2300">
+              <a:latin typeface="Arial" charset="0"/>
+              <a:cs typeface="Courier New" charset="0"/>
+            </a:endParaRPr>
+          </a:p>
+        </p:txBody>
+      </p:sp>
+      <p:sp>
+        <p:nvSpPr>
+          <p:cNvPr id="20483" name="Date Placeholder 3"/>
+          <p:cNvSpPr>
+            <a:spLocks noGrp="1"/>
+          </p:cNvSpPr>
+          <p:nvPr>
+            <p:ph type="dt" sz="quarter" idx="10"/>
+          </p:nvPr>
+        </p:nvSpPr>
+        <p:spPr>
+          <a:noFill/>
+          <a:ln/>
+          <a:extLst>
+            <a:ext uri="{909E8E84-426E-40dd-AFC4-6F175D3DCCD1}">
+              <a14:hiddenFill xmlns:a14="http://schemas.microsoft.com/office/drawing/2010/main">
+                <a:solidFill>
+                  <a:srgbClr val="FFFFFF"/>
+                </a:solidFill>
+              </a14:hiddenFill>
+            </a:ext>
+            <a:ext uri="{91240B29-F687-4f45-9708-019B960494DF}">
+              <a14:hiddenLine xmlns:a14="http://schemas.microsoft.com/office/drawing/2010/main" w="9525">
+                <a:solidFill>
+                  <a:srgbClr val="000000"/>
+                </a:solidFill>
+                <a:miter lim="800000"/>
+                <a:headEnd/>
+                <a:tailEnd/>
+              </a14:hiddenLine>
+            </a:ext>
+          </a:extLst>
+        </p:spPr>
+        <p:txBody>
+          <a:bodyPr/>
+          <a:lstStyle>
+            <a:lvl1pPr eaLnBrk="0" hangingPunct="0">
+              <a:defRPr sz="2400">
+                <a:solidFill>
+                  <a:schemeClr val="tx1"/>
+                </a:solidFill>
+                <a:latin typeface="Arial" charset="0"/>
+                <a:ea typeface="ＭＳ Ｐゴシック" charset="0"/>
+                <a:cs typeface="ＭＳ Ｐゴシック" charset="0"/>
+              </a:defRPr>
+            </a:lvl1pPr>
+            <a:lvl2pPr marL="742950" indent="-285750" eaLnBrk="0" hangingPunct="0">
+              <a:defRPr sz="2400">
+                <a:solidFill>
+                  <a:schemeClr val="tx1"/>
+                </a:solidFill>
+                <a:latin typeface="Arial" charset="0"/>
+                <a:ea typeface="ＭＳ Ｐゴシック" charset="0"/>
+              </a:defRPr>
+            </a:lvl2pPr>
+            <a:lvl3pPr marL="1143000" indent="-228600" eaLnBrk="0" hangingPunct="0">
+              <a:defRPr sz="2400">
+                <a:solidFill>
+                  <a:schemeClr val="tx1"/>
+                </a:solidFill>
+                <a:latin typeface="Arial" charset="0"/>
+                <a:ea typeface="ＭＳ Ｐゴシック" charset="0"/>
+              </a:defRPr>
+            </a:lvl3pPr>
+            <a:lvl4pPr marL="1600200" indent="-228600" eaLnBrk="0" hangingPunct="0">
+              <a:defRPr sz="2400">
+                <a:solidFill>
+                  <a:schemeClr val="tx1"/>
+                </a:solidFill>
+                <a:latin typeface="Arial" charset="0"/>
+                <a:ea typeface="ＭＳ Ｐゴシック" charset="0"/>
+              </a:defRPr>
+            </a:lvl4pPr>
+            <a:lvl5pPr marL="2057400" indent="-228600" eaLnBrk="0" hangingPunct="0">
+              <a:defRPr sz="2400">
+                <a:solidFill>
+                  <a:schemeClr val="tx1"/>
+                </a:solidFill>
+                <a:latin typeface="Arial" charset="0"/>
+                <a:ea typeface="ＭＳ Ｐゴシック" charset="0"/>
+              </a:defRPr>
+            </a:lvl5pPr>
+            <a:lvl6pPr marL="2514600" indent="-228600" eaLnBrk="0" fontAlgn="base" hangingPunct="0">
+              <a:spcBef>
+                <a:spcPct val="0"/>
+              </a:spcBef>
+              <a:spcAft>
+                <a:spcPct val="0"/>
+              </a:spcAft>
+              <a:defRPr sz="2400">
+                <a:solidFill>
+                  <a:schemeClr val="tx1"/>
+                </a:solidFill>
+                <a:latin typeface="Arial" charset="0"/>
+                <a:ea typeface="ＭＳ Ｐゴシック" charset="0"/>
+              </a:defRPr>
+            </a:lvl6pPr>
+            <a:lvl7pPr marL="2971800" indent="-228600" eaLnBrk="0" fontAlgn="base" hangingPunct="0">
+              <a:spcBef>
+                <a:spcPct val="0"/>
+              </a:spcBef>
+              <a:spcAft>
+                <a:spcPct val="0"/>
+              </a:spcAft>
+              <a:defRPr sz="2400">
+                <a:solidFill>
+                  <a:schemeClr val="tx1"/>
+                </a:solidFill>
+                <a:latin typeface="Arial" charset="0"/>
+                <a:ea typeface="ＭＳ Ｐゴシック" charset="0"/>
+              </a:defRPr>
+            </a:lvl7pPr>
+            <a:lvl8pPr marL="3429000" indent="-228600" eaLnBrk="0" fontAlgn="base" hangingPunct="0">
+              <a:spcBef>
+                <a:spcPct val="0"/>
+              </a:spcBef>
+              <a:spcAft>
+                <a:spcPct val="0"/>
+              </a:spcAft>
+              <a:defRPr sz="2400">
+                <a:solidFill>
+                  <a:schemeClr val="tx1"/>
+                </a:solidFill>
+                <a:latin typeface="Arial" charset="0"/>
+                <a:ea typeface="ＭＳ Ｐゴシック" charset="0"/>
+              </a:defRPr>
+            </a:lvl8pPr>
+            <a:lvl9pPr marL="3886200" indent="-228600" eaLnBrk="0" fontAlgn="base" hangingPunct="0">
+              <a:spcBef>
+                <a:spcPct val="0"/>
+              </a:spcBef>
+              <a:spcAft>
+                <a:spcPct val="0"/>
+              </a:spcAft>
+              <a:defRPr sz="2400">
+                <a:solidFill>
+                  <a:schemeClr val="tx1"/>
+                </a:solidFill>
+                <a:latin typeface="Arial" charset="0"/>
+                <a:ea typeface="ＭＳ Ｐゴシック" charset="0"/>
+              </a:defRPr>
+            </a:lvl9pPr>
+          </a:lstStyle>
+          <a:p>
+            <a:pPr eaLnBrk="1" hangingPunct="1"/>
+            <a:fld id="{6BA7C32A-5037-B24A-B57D-52BD98F4652A}" type="datetime1">
+              <a:rPr lang="en-US" sz="1200">
+                <a:latin typeface="Garamond" charset="0"/>
+              </a:rPr>
+              <a:pPr eaLnBrk="1" hangingPunct="1"/>
+              <a:t>9/28/15</a:t>
+            </a:fld>
+            <a:endParaRPr lang="en-US" sz="1200">
+              <a:latin typeface="Garamond" charset="0"/>
+            </a:endParaRPr>
+          </a:p>
+        </p:txBody>
+      </p:sp>
+      <p:sp>
+        <p:nvSpPr>
+          <p:cNvPr id="5" name="Footer Placeholder 4"/>
+          <p:cNvSpPr>
+            <a:spLocks noGrp="1"/>
+          </p:cNvSpPr>
+          <p:nvPr>
+            <p:ph type="ftr" sz="quarter" idx="11"/>
+          </p:nvPr>
+        </p:nvSpPr>
+        <p:spPr/>
+        <p:txBody>
+          <a:bodyPr/>
+          <a:lstStyle/>
+          <a:p>
+            <a:pPr>
+              <a:defRPr/>
+            </a:pPr>
+            <a:r>
+              <a:rPr lang="en-US" altLang="en-US"/>
+              <a:t>ECE Application Programming:  Lecture 20</a:t>
+            </a:r>
+          </a:p>
+        </p:txBody>
+      </p:sp>
+      <p:sp>
+        <p:nvSpPr>
+          <p:cNvPr id="20485" name="Slide Number Placeholder 5"/>
+          <p:cNvSpPr>
+            <a:spLocks noGrp="1"/>
+          </p:cNvSpPr>
+          <p:nvPr>
+            <p:ph type="sldNum" sz="quarter" idx="12"/>
+          </p:nvPr>
+        </p:nvSpPr>
+        <p:spPr>
+          <a:noFill/>
+          <a:ln/>
+          <a:extLst>
+            <a:ext uri="{909E8E84-426E-40dd-AFC4-6F175D3DCCD1}">
+              <a14:hiddenFill xmlns:a14="http://schemas.microsoft.com/office/drawing/2010/main">
+                <a:solidFill>
+                  <a:srgbClr val="FFFFFF"/>
+                </a:solidFill>
+              </a14:hiddenFill>
+            </a:ext>
+            <a:ext uri="{91240B29-F687-4f45-9708-019B960494DF}">
+              <a14:hiddenLine xmlns:a14="http://schemas.microsoft.com/office/drawing/2010/main" w="9525">
+                <a:solidFill>
+                  <a:srgbClr val="000000"/>
+                </a:solidFill>
+                <a:miter lim="800000"/>
+                <a:headEnd/>
+                <a:tailEnd/>
+              </a14:hiddenLine>
+            </a:ext>
+          </a:extLst>
+        </p:spPr>
+        <p:txBody>
+          <a:bodyPr/>
+          <a:lstStyle>
+            <a:lvl1pPr eaLnBrk="0" hangingPunct="0">
+              <a:defRPr sz="2400">
+                <a:solidFill>
+                  <a:schemeClr val="tx1"/>
+                </a:solidFill>
+                <a:latin typeface="Arial" charset="0"/>
+                <a:ea typeface="ＭＳ Ｐゴシック" charset="0"/>
+                <a:cs typeface="ＭＳ Ｐゴシック" charset="0"/>
+              </a:defRPr>
+            </a:lvl1pPr>
+            <a:lvl2pPr marL="742950" indent="-285750" eaLnBrk="0" hangingPunct="0">
+              <a:defRPr sz="2400">
+                <a:solidFill>
+                  <a:schemeClr val="tx1"/>
+                </a:solidFill>
+                <a:latin typeface="Arial" charset="0"/>
+                <a:ea typeface="ＭＳ Ｐゴシック" charset="0"/>
+              </a:defRPr>
+            </a:lvl2pPr>
+            <a:lvl3pPr marL="1143000" indent="-228600" eaLnBrk="0" hangingPunct="0">
+              <a:defRPr sz="2400">
+                <a:solidFill>
+                  <a:schemeClr val="tx1"/>
+                </a:solidFill>
+                <a:latin typeface="Arial" charset="0"/>
+                <a:ea typeface="ＭＳ Ｐゴシック" charset="0"/>
+              </a:defRPr>
+            </a:lvl3pPr>
+            <a:lvl4pPr marL="1600200" indent="-228600" eaLnBrk="0" hangingPunct="0">
+              <a:defRPr sz="2400">
+                <a:solidFill>
+                  <a:schemeClr val="tx1"/>
+                </a:solidFill>
+                <a:latin typeface="Arial" charset="0"/>
+                <a:ea typeface="ＭＳ Ｐゴシック" charset="0"/>
+              </a:defRPr>
+            </a:lvl4pPr>
+            <a:lvl5pPr marL="2057400" indent="-228600" eaLnBrk="0" hangingPunct="0">
+              <a:defRPr sz="2400">
+                <a:solidFill>
+                  <a:schemeClr val="tx1"/>
+                </a:solidFill>
+                <a:latin typeface="Arial" charset="0"/>
+                <a:ea typeface="ＭＳ Ｐゴシック" charset="0"/>
+              </a:defRPr>
+            </a:lvl5pPr>
+            <a:lvl6pPr marL="2514600" indent="-228600" eaLnBrk="0" fontAlgn="base" hangingPunct="0">
+              <a:spcBef>
+                <a:spcPct val="0"/>
+              </a:spcBef>
+              <a:spcAft>
+                <a:spcPct val="0"/>
+              </a:spcAft>
+              <a:defRPr sz="2400">
+                <a:solidFill>
+                  <a:schemeClr val="tx1"/>
+                </a:solidFill>
+                <a:latin typeface="Arial" charset="0"/>
+                <a:ea typeface="ＭＳ Ｐゴシック" charset="0"/>
+              </a:defRPr>
+            </a:lvl6pPr>
+            <a:lvl7pPr marL="2971800" indent="-228600" eaLnBrk="0" fontAlgn="base" hangingPunct="0">
+              <a:spcBef>
+                <a:spcPct val="0"/>
+              </a:spcBef>
+              <a:spcAft>
+                <a:spcPct val="0"/>
+              </a:spcAft>
+              <a:defRPr sz="2400">
+                <a:solidFill>
+                  <a:schemeClr val="tx1"/>
+                </a:solidFill>
+                <a:latin typeface="Arial" charset="0"/>
+                <a:ea typeface="ＭＳ Ｐゴシック" charset="0"/>
+              </a:defRPr>
+            </a:lvl7pPr>
+            <a:lvl8pPr marL="3429000" indent="-228600" eaLnBrk="0" fontAlgn="base" hangingPunct="0">
+              <a:spcBef>
+                <a:spcPct val="0"/>
+              </a:spcBef>
+              <a:spcAft>
+                <a:spcPct val="0"/>
+              </a:spcAft>
+              <a:defRPr sz="2400">
+                <a:solidFill>
+                  <a:schemeClr val="tx1"/>
+                </a:solidFill>
+                <a:latin typeface="Arial" charset="0"/>
+                <a:ea typeface="ＭＳ Ｐゴシック" charset="0"/>
+              </a:defRPr>
+            </a:lvl8pPr>
+            <a:lvl9pPr marL="3886200" indent="-228600" eaLnBrk="0" fontAlgn="base" hangingPunct="0">
+              <a:spcBef>
+                <a:spcPct val="0"/>
+              </a:spcBef>
+              <a:spcAft>
+                <a:spcPct val="0"/>
+              </a:spcAft>
+              <a:defRPr sz="2400">
+                <a:solidFill>
+                  <a:schemeClr val="tx1"/>
+                </a:solidFill>
+                <a:latin typeface="Arial" charset="0"/>
+                <a:ea typeface="ＭＳ Ｐゴシック" charset="0"/>
+              </a:defRPr>
+            </a:lvl9pPr>
+          </a:lstStyle>
+          <a:p>
+            <a:pPr eaLnBrk="1" hangingPunct="1"/>
+            <a:fld id="{565BAA3E-7D64-C346-802B-746F8B0060FE}" type="slidenum">
+              <a:rPr lang="en-US" sz="1200">
+                <a:latin typeface="Garamond" charset="0"/>
+              </a:rPr>
+              <a:pPr eaLnBrk="1" hangingPunct="1"/>
+              <a:t>13</a:t>
+            </a:fld>
+            <a:endParaRPr lang="en-US" sz="1200">
+              <a:latin typeface="Garamond" charset="0"/>
+            </a:endParaRPr>
+          </a:p>
+        </p:txBody>
+      </p:sp>
+    </p:spTree>
+    <p:extLst>
+      <p:ext uri="{BB962C8B-B14F-4D97-AF65-F5344CB8AC3E}">
+        <p14:creationId xmlns:p14="http://schemas.microsoft.com/office/powerpoint/2010/main" val="2989564956"/>
+      </p:ext>
+    </p:extLst>
+  </p:cSld>
+  <p:clrMapOvr>
+    <a:masterClrMapping/>
+  </p:clrMapOvr>
+  <p:timing>
+    <p:tnLst>
+      <p:par>
+        <p:cTn xmlns:p14="http://schemas.microsoft.com/office/powerpoint/2010/main" id="1" dur="indefinite" restart="never" nodeType="tmRoot"/>
+      </p:par>
+    </p:tnLst>
+  </p:timing>
+</p:sld>
+</file>
+
+<file path=ppt/slides/slide14.xml><?xml version="1.0" encoding="utf-8"?>
+<p:sld xmlns:a="http://schemas.openxmlformats.org/drawingml/2006/main" xmlns:r="http://schemas.openxmlformats.org/officeDocument/2006/relationships" xmlns:p="http://schemas.openxmlformats.org/presentationml/2006/main">
+  <p:cSld>
+    <p:spTree>
+      <p:nvGrpSpPr>
+        <p:cNvPr id="1" name=""/>
+        <p:cNvGrpSpPr/>
+        <p:nvPr/>
+      </p:nvGrpSpPr>
+      <p:grpSpPr>
+        <a:xfrm>
+          <a:off x="0" y="0"/>
+          <a:ext cx="0" cy="0"/>
+          <a:chOff x="0" y="0"/>
+          <a:chExt cx="0" cy="0"/>
+        </a:xfrm>
+      </p:grpSpPr>
+      <p:sp>
+        <p:nvSpPr>
           <p:cNvPr id="19458" name="Title 1"/>
           <p:cNvSpPr>
             <a:spLocks noGrp="1"/>
@@ -8168,11 +8850,43 @@
               </a:lnSpc>
             </a:pPr>
             <a:r>
-              <a:rPr lang="en-US" smtClean="0">
-                <a:latin typeface="Arial" charset="0"/>
-              </a:rPr>
-              <a:t>No calculators or other electronic devices allowed</a:t>
-            </a:r>
+              <a:rPr lang="en-US" dirty="0" smtClean="0">
+                <a:latin typeface="Arial" charset="0"/>
+              </a:rPr>
+              <a:t>No calculators or other electronic devices </a:t>
+            </a:r>
+            <a:r>
+              <a:rPr lang="en-US" dirty="0" smtClean="0">
+                <a:latin typeface="Arial" charset="0"/>
+              </a:rPr>
+              <a:t>allowed</a:t>
+            </a:r>
+          </a:p>
+          <a:p>
+            <a:pPr lvl="2">
+              <a:lnSpc>
+                <a:spcPct val="90000"/>
+              </a:lnSpc>
+            </a:pPr>
+            <a:r>
+              <a:rPr lang="en-US" b="1" dirty="0">
+                <a:solidFill>
+                  <a:srgbClr val="FF0000"/>
+                </a:solidFill>
+                <a:latin typeface="Arial" charset="0"/>
+              </a:rPr>
+              <a:t>Please attend the section in which you are registered unless you have received permission to attend another section</a:t>
+            </a:r>
+          </a:p>
+          <a:p>
+            <a:pPr lvl="2">
+              <a:lnSpc>
+                <a:spcPct val="90000"/>
+              </a:lnSpc>
+            </a:pPr>
+            <a:endParaRPr lang="en-US" dirty="0" smtClean="0">
+              <a:latin typeface="Arial" charset="0"/>
+            </a:endParaRPr>
           </a:p>
           <a:p>
             <a:pPr lvl="1"/>
@@ -8318,7 +9032,7 @@
                 <a:latin typeface="Garamond" charset="0"/>
               </a:rPr>
               <a:pPr eaLnBrk="1" hangingPunct="1"/>
-              <a:t>9/26/15</a:t>
+              <a:t>9/28/15</a:t>
             </a:fld>
             <a:endParaRPr lang="en-US">
               <a:latin typeface="Garamond" charset="0"/>
@@ -8487,7 +9201,7 @@
                 <a:latin typeface="Garamond" charset="0"/>
               </a:rPr>
               <a:pPr eaLnBrk="1" hangingPunct="1"/>
-              <a:t>13</a:t>
+              <a:t>14</a:t>
             </a:fld>
             <a:endParaRPr lang="en-US">
               <a:latin typeface="Garamond" charset="0"/>
@@ -8677,8 +9391,36 @@
               <a:rPr lang="en-US" dirty="0">
                 <a:latin typeface="Arial" charset="0"/>
               </a:rPr>
-              <a:t>No calculators or other electronic devices allowed</a:t>
-            </a:r>
+              <a:t>No calculators or other electronic devices </a:t>
+            </a:r>
+            <a:r>
+              <a:rPr lang="en-US" dirty="0" smtClean="0">
+                <a:latin typeface="Arial" charset="0"/>
+              </a:rPr>
+              <a:t>allowed</a:t>
+            </a:r>
+          </a:p>
+          <a:p>
+            <a:pPr lvl="2">
+              <a:lnSpc>
+                <a:spcPct val="90000"/>
+              </a:lnSpc>
+            </a:pPr>
+            <a:r>
+              <a:rPr lang="en-US" b="1" dirty="0" smtClean="0">
+                <a:solidFill>
+                  <a:srgbClr val="FF0000"/>
+                </a:solidFill>
+                <a:latin typeface="Arial" charset="0"/>
+              </a:rPr>
+              <a:t>Please attend the section in which you are registered unless you have received permission to attend another section</a:t>
+            </a:r>
+            <a:endParaRPr lang="en-US" b="1" dirty="0">
+              <a:solidFill>
+                <a:srgbClr val="FF0000"/>
+              </a:solidFill>
+              <a:latin typeface="Arial" charset="0"/>
+            </a:endParaRPr>
           </a:p>
           <a:p>
             <a:pPr>
@@ -8875,7 +9617,7 @@
                 <a:latin typeface="Garamond" charset="0"/>
               </a:rPr>
               <a:pPr eaLnBrk="1" hangingPunct="1"/>
-              <a:t>9/26/15</a:t>
+              <a:t>9/28/15</a:t>
             </a:fld>
             <a:endParaRPr lang="en-US">
               <a:latin typeface="Garamond" charset="0"/>
@@ -9464,7 +10206,7 @@
                 <a:latin typeface="Garamond" charset="0"/>
               </a:rPr>
               <a:pPr eaLnBrk="1" hangingPunct="1"/>
-              <a:t>9/26/15</a:t>
+              <a:t>9/28/15</a:t>
             </a:fld>
             <a:endParaRPr lang="en-US">
               <a:latin typeface="Garamond" charset="0"/>
@@ -9724,19 +10466,7 @@
               <a:rPr lang="en-US" dirty="0" smtClean="0">
                 <a:ea typeface="+mn-ea"/>
               </a:rPr>
-              <a:t>Prior to passing out exam, </a:t>
-            </a:r>
-            <a:r>
-              <a:rPr lang="en-US" dirty="0" smtClean="0">
-                <a:ea typeface="+mn-ea"/>
-              </a:rPr>
-              <a:t>your instructor </a:t>
-            </a:r>
-            <a:r>
-              <a:rPr lang="en-US" dirty="0" smtClean="0">
-                <a:ea typeface="+mn-ea"/>
-              </a:rPr>
-              <a:t>will verify that you only have one note sheet</a:t>
+              <a:t>Prior to passing out exam, your instructor will verify that you only have one note sheet</a:t>
             </a:r>
           </a:p>
           <a:p>
@@ -9937,7 +10667,7 @@
                 <a:latin typeface="Garamond" charset="0"/>
               </a:rPr>
               <a:pPr eaLnBrk="1" hangingPunct="1"/>
-              <a:t>9/26/15</a:t>
+              <a:t>9/28/15</a:t>
             </a:fld>
             <a:endParaRPr lang="en-US">
               <a:latin typeface="Garamond" charset="0"/>
@@ -10634,7 +11364,7 @@
                 <a:latin typeface="Garamond" charset="0"/>
               </a:rPr>
               <a:pPr eaLnBrk="1" hangingPunct="1"/>
-              <a:t>9/26/15</a:t>
+              <a:t>9/28/15</a:t>
             </a:fld>
             <a:endParaRPr lang="en-US">
               <a:latin typeface="Garamond" charset="0"/>
@@ -10979,7 +11709,7 @@
                 <a:latin typeface="Garamond" charset="0"/>
               </a:rPr>
               <a:pPr eaLnBrk="1" hangingPunct="1"/>
-              <a:t>9/26/15</a:t>
+              <a:t>9/28/15</a:t>
             </a:fld>
             <a:endParaRPr lang="en-US">
               <a:latin typeface="Garamond" charset="0"/>
@@ -11932,7 +12662,7 @@
                 <a:latin typeface="Garamond" charset="0"/>
               </a:rPr>
               <a:pPr/>
-              <a:t>9/26/15</a:t>
+              <a:t>9/28/15</a:t>
             </a:fld>
             <a:endParaRPr lang="en-US" sz="1200">
               <a:latin typeface="Garamond" charset="0"/>
@@ -13324,7 +14054,7 @@
                 <a:latin typeface="Garamond" charset="0"/>
               </a:rPr>
               <a:pPr eaLnBrk="1" hangingPunct="1"/>
-              <a:t>9/26/15</a:t>
+              <a:t>9/28/15</a:t>
             </a:fld>
             <a:endParaRPr lang="en-US">
               <a:latin typeface="Garamond" charset="0"/>
@@ -13640,7 +14370,7 @@
                 <a:latin typeface="Garamond" charset="0"/>
               </a:rPr>
               <a:pPr eaLnBrk="1" hangingPunct="1"/>
-              <a:t>9/26/15</a:t>
+              <a:t>9/28/15</a:t>
             </a:fld>
             <a:endParaRPr lang="en-US">
               <a:latin typeface="Garamond" charset="0"/>

</xml_diff>